<commit_message>
mall bug in hw1 pdf. slide changes
</commit_message>
<xml_diff>
--- a/slides/04-ExpertSystems.pptx
+++ b/slides/04-ExpertSystems.pptx
@@ -5,7 +5,7 @@
     <p:sldMasterId id="2147483679" r:id="rId1"/>
   </p:sldMasterIdLst>
   <p:notesMasterIdLst>
-    <p:notesMasterId r:id="rId79"/>
+    <p:notesMasterId r:id="rId71"/>
   </p:notesMasterIdLst>
   <p:sldIdLst>
     <p:sldId id="305" r:id="rId2"/>
@@ -72,19 +72,11 @@
     <p:sldId id="274" r:id="rId63"/>
     <p:sldId id="273" r:id="rId64"/>
     <p:sldId id="281" r:id="rId65"/>
-    <p:sldId id="371" r:id="rId66"/>
-    <p:sldId id="372" r:id="rId67"/>
-    <p:sldId id="373" r:id="rId68"/>
-    <p:sldId id="374" r:id="rId69"/>
-    <p:sldId id="375" r:id="rId70"/>
-    <p:sldId id="377" r:id="rId71"/>
-    <p:sldId id="378" r:id="rId72"/>
-    <p:sldId id="376" r:id="rId73"/>
-    <p:sldId id="282" r:id="rId74"/>
-    <p:sldId id="384" r:id="rId75"/>
-    <p:sldId id="385" r:id="rId76"/>
-    <p:sldId id="386" r:id="rId77"/>
-    <p:sldId id="387" r:id="rId78"/>
+    <p:sldId id="282" r:id="rId66"/>
+    <p:sldId id="384" r:id="rId67"/>
+    <p:sldId id="385" r:id="rId68"/>
+    <p:sldId id="386" r:id="rId69"/>
+    <p:sldId id="387" r:id="rId70"/>
   </p:sldIdLst>
   <p:sldSz cx="12192000" cy="6858000"/>
   <p:notesSz cx="7315200" cy="9601200"/>
@@ -1237,7 +1229,7 @@
             <a:fld id="{FD7B744F-E70B-45B7-9E3C-4AADC86E6019}" type="slidenum">
               <a:rPr lang="en-US" altLang="en-US"/>
               <a:pPr/>
-              <a:t>73</a:t>
+              <a:t>65</a:t>
             </a:fld>
             <a:endParaRPr lang="en-US" altLang="en-US"/>
           </a:p>
@@ -21687,9 +21679,9 @@
       </p:grpSpPr>
       <p:sp>
         <p:nvSpPr>
-          <p:cNvPr id="2" name="Title 1"/>
-          <p:cNvSpPr>
-            <a:spLocks noGrp="1"/>
+          <p:cNvPr id="55298" name="Rectangle 2"/>
+          <p:cNvSpPr>
+            <a:spLocks noGrp="1" noChangeArrowheads="1"/>
           </p:cNvSpPr>
           <p:nvPr>
             <p:ph type="title"/>
@@ -21701,93 +21693,88 @@
           <a:lstStyle/>
           <a:p>
             <a:r>
-              <a:rPr lang="en-US" dirty="0"/>
-              <a:t>Two Big Problems</a:t>
-            </a:r>
-          </a:p>
-        </p:txBody>
-      </p:sp>
-      <p:sp>
-        <p:nvSpPr>
-          <p:cNvPr id="3" name="Content Placeholder 2"/>
+              <a:rPr lang="en-US" altLang="en-US"/>
+              <a:t>Some Prominent Expert Systems</a:t>
+            </a:r>
+          </a:p>
+        </p:txBody>
+      </p:sp>
+      <p:sp>
+        <p:nvSpPr>
+          <p:cNvPr id="4" name="Content Placeholder 3"/>
           <p:cNvSpPr>
             <a:spLocks noGrp="1"/>
           </p:cNvSpPr>
           <p:nvPr>
-            <p:ph sz="half" idx="1"/>
-          </p:nvPr>
-        </p:nvSpPr>
-        <p:spPr>
-          <a:xfrm>
-            <a:off x="913795" y="1732448"/>
-            <a:ext cx="10353762" cy="4515951"/>
-          </a:xfrm>
-        </p:spPr>
-        <p:txBody>
-          <a:bodyPr>
-            <a:normAutofit/>
-          </a:bodyPr>
+            <p:ph idx="1"/>
+          </p:nvPr>
+        </p:nvSpPr>
+        <p:spPr/>
+        <p:txBody>
+          <a:bodyPr/>
           <a:lstStyle/>
           <a:p>
-            <a:endParaRPr lang="en-US" dirty="0">
-              <a:effectLst/>
-            </a:endParaRPr>
-          </a:p>
-          <a:p>
-            <a:r>
-              <a:rPr lang="en-US" dirty="0">
-                <a:effectLst/>
-              </a:rPr>
-              <a:t>Knowledge takes a long time to build</a:t>
-            </a:r>
-          </a:p>
-          <a:p>
-            <a:pPr lvl="1"/>
-            <a:endParaRPr lang="en-US" dirty="0">
-              <a:effectLst/>
-            </a:endParaRPr>
-          </a:p>
-          <a:p>
-            <a:endParaRPr lang="en-US" dirty="0">
-              <a:effectLst/>
-            </a:endParaRPr>
-          </a:p>
-          <a:p>
-            <a:r>
-              <a:rPr lang="en-US" dirty="0">
-                <a:effectLst/>
-              </a:rPr>
-              <a:t>Knowledge is always changing</a:t>
-            </a:r>
-          </a:p>
-          <a:p>
-            <a:pPr lvl="1"/>
-            <a:endParaRPr lang="en-US" dirty="0">
-              <a:effectLst/>
-            </a:endParaRPr>
-          </a:p>
-          <a:p>
-            <a:pPr lvl="1"/>
-            <a:endParaRPr lang="en-US" dirty="0">
-              <a:effectLst/>
-            </a:endParaRPr>
-          </a:p>
-          <a:p>
-            <a:r>
-              <a:rPr lang="en-US" dirty="0">
-                <a:effectLst/>
-              </a:rPr>
-              <a:t>How might you deal with this?</a:t>
-            </a:r>
+            <a:r>
+              <a:rPr lang="en-US" altLang="en-US" b="1" dirty="0" err="1"/>
+              <a:t>Dendral</a:t>
+            </a:r>
+            <a:endParaRPr lang="en-US" altLang="en-US" b="1" dirty="0"/>
+          </a:p>
+          <a:p>
+            <a:pPr>
+              <a:buFont typeface="Wingdings" panose="05000000000000000000" pitchFamily="2" charset="2"/>
+              <a:buNone/>
+            </a:pPr>
+            <a:endParaRPr lang="en-US" altLang="en-US" b="1" dirty="0"/>
+          </a:p>
+          <a:p>
+            <a:r>
+              <a:rPr lang="en-US" altLang="en-US" b="1" dirty="0" err="1"/>
+              <a:t>Dipmeter</a:t>
+            </a:r>
+            <a:r>
+              <a:rPr lang="en-US" altLang="en-US" b="1" dirty="0"/>
+              <a:t> Advisor</a:t>
+            </a:r>
+          </a:p>
+          <a:p>
+            <a:pPr>
+              <a:buFont typeface="Wingdings" panose="05000000000000000000" pitchFamily="2" charset="2"/>
+              <a:buNone/>
+            </a:pPr>
+            <a:endParaRPr lang="en-US" altLang="en-US" b="1" dirty="0"/>
+          </a:p>
+          <a:p>
+            <a:r>
+              <a:rPr lang="en-US" altLang="en-US" b="1" dirty="0" err="1"/>
+              <a:t>Mycin</a:t>
+            </a:r>
+            <a:endParaRPr lang="en-US" altLang="en-US" b="1" dirty="0"/>
+          </a:p>
+          <a:p>
+            <a:pPr>
+              <a:buFont typeface="Wingdings" panose="05000000000000000000" pitchFamily="2" charset="2"/>
+              <a:buNone/>
+            </a:pPr>
+            <a:endParaRPr lang="en-US" altLang="en-US" b="1" dirty="0"/>
+          </a:p>
+          <a:p>
+            <a:r>
+              <a:rPr lang="en-US" altLang="en-US" b="1" dirty="0"/>
+              <a:t>R1/</a:t>
+            </a:r>
+            <a:r>
+              <a:rPr lang="en-US" altLang="en-US" b="1" dirty="0" err="1"/>
+              <a:t>Xcon</a:t>
+            </a:r>
+            <a:endParaRPr lang="en-US" altLang="en-US" b="1" dirty="0"/>
+          </a:p>
+          <a:p>
+            <a:endParaRPr lang="en-US" dirty="0"/>
           </a:p>
         </p:txBody>
       </p:sp>
     </p:spTree>
-    <p:extLst>
-      <p:ext uri="{BB962C8B-B14F-4D97-AF65-F5344CB8AC3E}">
-        <p14:creationId xmlns:p14="http://schemas.microsoft.com/office/powerpoint/2010/main" val="3635443244"/>
-      </p:ext>
-    </p:extLst>
   </p:cSld>
   <p:clrMapOvr>
     <a:masterClrMapping/>
@@ -21829,7 +21816,7 @@
           <a:p>
             <a:r>
               <a:rPr lang="en-US" dirty="0"/>
-              <a:t>Automatic Knowledge-Acquisition</a:t>
+              <a:t>MYCIN</a:t>
             </a:r>
           </a:p>
         </p:txBody>
@@ -21841,13 +21828,13 @@
             <a:spLocks noGrp="1"/>
           </p:cNvSpPr>
           <p:nvPr>
-            <p:ph sz="half" idx="1"/>
+            <p:ph idx="1"/>
           </p:nvPr>
         </p:nvSpPr>
         <p:spPr>
           <a:xfrm>
-            <a:off x="913795" y="1732448"/>
-            <a:ext cx="10353762" cy="4515951"/>
+            <a:off x="913795" y="1732449"/>
+            <a:ext cx="10353762" cy="4592151"/>
           </a:xfrm>
         </p:spPr>
         <p:txBody>
@@ -21856,47 +21843,69 @@
           </a:bodyPr>
           <a:lstStyle/>
           <a:p>
-            <a:endParaRPr lang="en-US" dirty="0">
-              <a:effectLst/>
-            </a:endParaRPr>
-          </a:p>
-          <a:p>
-            <a:r>
-              <a:rPr lang="en-US" dirty="0">
-                <a:effectLst/>
-              </a:rPr>
-              <a:t>Having domain experts create knowledge and update / maintain it is tedious</a:t>
-            </a:r>
-          </a:p>
-          <a:p>
-            <a:endParaRPr lang="en-US" dirty="0">
-              <a:effectLst/>
-            </a:endParaRPr>
-          </a:p>
-          <a:p>
-            <a:r>
-              <a:rPr lang="en-US" dirty="0">
-                <a:effectLst/>
-              </a:rPr>
-              <a:t>Automatic Knowledge Acquisition is a set of techniques for automatically acquiring, validating, and incorporating new knowledge into an expert knowledge base</a:t>
-            </a:r>
-          </a:p>
-          <a:p>
-            <a:endParaRPr lang="en-US" dirty="0">
-              <a:effectLst/>
-            </a:endParaRPr>
-          </a:p>
-          <a:p>
-            <a:endParaRPr lang="en-US" dirty="0">
-              <a:effectLst/>
-            </a:endParaRPr>
+            <a:r>
+              <a:rPr lang="en-US" dirty="0"/>
+              <a:t>Developed in the 1970s at Stanford</a:t>
+            </a:r>
+          </a:p>
+          <a:p>
+            <a:endParaRPr lang="en-US" dirty="0"/>
+          </a:p>
+          <a:p>
+            <a:r>
+              <a:rPr lang="en-US" dirty="0"/>
+              <a:t>Job was to diagnose certain blood infections (pretty specific task)</a:t>
+            </a:r>
+          </a:p>
+          <a:p>
+            <a:endParaRPr lang="en-US" dirty="0"/>
+          </a:p>
+          <a:p>
+            <a:r>
+              <a:rPr lang="en-US" dirty="0"/>
+              <a:t>One of the first successful expert systems</a:t>
+            </a:r>
+          </a:p>
+          <a:p>
+            <a:pPr lvl="1"/>
+            <a:r>
+              <a:rPr lang="en-US" dirty="0"/>
+              <a:t>Rule-Based, so very similar to example we saw</a:t>
+            </a:r>
+          </a:p>
+          <a:p>
+            <a:pPr lvl="1"/>
+            <a:endParaRPr lang="en-US" dirty="0"/>
+          </a:p>
+          <a:p>
+            <a:r>
+              <a:rPr lang="en-US" dirty="0"/>
+              <a:t>Written in LISP (</a:t>
+            </a:r>
+            <a:r>
+              <a:rPr lang="en-US" dirty="0" err="1"/>
+              <a:t>Woooooooo</a:t>
+            </a:r>
+            <a:r>
+              <a:rPr lang="en-US" dirty="0"/>
+              <a:t>…LISP!!!!)</a:t>
+            </a:r>
+          </a:p>
+          <a:p>
+            <a:endParaRPr lang="en-US" dirty="0"/>
+          </a:p>
+          <a:p>
+            <a:r>
+              <a:rPr lang="en-US" dirty="0"/>
+              <a:t>Goal-directed system (uses backward chaining primarily)</a:t>
+            </a:r>
           </a:p>
         </p:txBody>
       </p:sp>
     </p:spTree>
     <p:extLst>
       <p:ext uri="{BB962C8B-B14F-4D97-AF65-F5344CB8AC3E}">
-        <p14:creationId xmlns:p14="http://schemas.microsoft.com/office/powerpoint/2010/main" val="3996324466"/>
+        <p14:creationId xmlns:p14="http://schemas.microsoft.com/office/powerpoint/2010/main" val="2576179616"/>
       </p:ext>
     </p:extLst>
   </p:cSld>
@@ -21940,7 +21949,7 @@
           <a:p>
             <a:r>
               <a:rPr lang="en-US" dirty="0"/>
-              <a:t>Automatic Knowledge-Acquisition</a:t>
+              <a:t>MYCIN</a:t>
             </a:r>
           </a:p>
         </p:txBody>
@@ -21952,81 +21961,75 @@
             <a:spLocks noGrp="1"/>
           </p:cNvSpPr>
           <p:nvPr>
-            <p:ph sz="half" idx="1"/>
-          </p:nvPr>
-        </p:nvSpPr>
-        <p:spPr>
-          <a:xfrm>
-            <a:off x="913795" y="1732448"/>
-            <a:ext cx="10353762" cy="4515951"/>
-          </a:xfrm>
-        </p:spPr>
-        <p:txBody>
-          <a:bodyPr>
-            <a:normAutofit/>
-          </a:bodyPr>
+            <p:ph idx="1"/>
+          </p:nvPr>
+        </p:nvSpPr>
+        <p:spPr/>
+        <p:txBody>
+          <a:bodyPr/>
           <a:lstStyle/>
           <a:p>
-            <a:endParaRPr lang="en-US" dirty="0">
-              <a:effectLst/>
-            </a:endParaRPr>
-          </a:p>
-          <a:p>
-            <a:r>
-              <a:rPr lang="en-US" dirty="0">
-                <a:effectLst/>
-              </a:rPr>
-              <a:t>Natural Language Processing:</a:t>
+            <a:r>
+              <a:rPr lang="en-US" dirty="0"/>
+              <a:t>Used backward chaining…but</a:t>
             </a:r>
           </a:p>
           <a:p>
             <a:pPr lvl="1"/>
             <a:r>
-              <a:rPr lang="en-US" dirty="0">
-                <a:effectLst/>
-              </a:rPr>
-              <a:t>Try to parse Wikipedia, technical documents, etc. to automatically build your knowledge base. </a:t>
-            </a:r>
+              <a:rPr lang="en-US" dirty="0"/>
+              <a:t>As it is backward chaining, would ask the patient questions if it hit a variable that it needed an answer to.</a:t>
+            </a:r>
+          </a:p>
+          <a:p>
+            <a:pPr lvl="2"/>
+            <a:r>
+              <a:rPr lang="en-US" dirty="0"/>
+              <a:t>Example: if chaining runs into “User feels dizzy” and doesn’t know, it would prompt user to answer</a:t>
+            </a:r>
+          </a:p>
+          <a:p>
+            <a:pPr lvl="2"/>
+            <a:r>
+              <a:rPr lang="en-US" dirty="0"/>
+              <a:t>This would sometimes lead to user being asked MANY questions</a:t>
+            </a:r>
+          </a:p>
+          <a:p>
+            <a:pPr lvl="2"/>
+            <a:endParaRPr lang="en-US" dirty="0"/>
           </a:p>
           <a:p>
             <a:pPr lvl="1"/>
-            <a:endParaRPr lang="en-US" dirty="0">
-              <a:effectLst/>
-            </a:endParaRPr>
-          </a:p>
-          <a:p>
-            <a:r>
-              <a:rPr lang="en-US" dirty="0">
-                <a:effectLst/>
-              </a:rPr>
-              <a:t>Usually this would be just a first pass (as it doesn’t work that well).</a:t>
-            </a:r>
+            <a:r>
+              <a:rPr lang="en-US" dirty="0"/>
+              <a:t>Used heuristics to simplify the backward chaining search</a:t>
+            </a:r>
+          </a:p>
+          <a:p>
+            <a:pPr lvl="2"/>
+            <a:r>
+              <a:rPr lang="en-US" dirty="0"/>
+              <a:t>Some paths ignored and not explored</a:t>
+            </a:r>
+          </a:p>
+          <a:p>
+            <a:pPr lvl="2"/>
+            <a:endParaRPr lang="en-US" dirty="0"/>
           </a:p>
           <a:p>
             <a:pPr lvl="1"/>
             <a:r>
-              <a:rPr lang="en-US" dirty="0">
-                <a:effectLst/>
-              </a:rPr>
-              <a:t>Then, some process for an expert to clean-up the knowledge</a:t>
-            </a:r>
-          </a:p>
-          <a:p>
-            <a:endParaRPr lang="en-US" dirty="0">
-              <a:effectLst/>
-            </a:endParaRPr>
-          </a:p>
-          <a:p>
-            <a:endParaRPr lang="en-US" dirty="0">
-              <a:effectLst/>
-            </a:endParaRPr>
+              <a:rPr lang="en-US" dirty="0"/>
+              <a:t>Also would ask general questions to all patients to try to simplify the search process</a:t>
+            </a:r>
           </a:p>
         </p:txBody>
       </p:sp>
     </p:spTree>
     <p:extLst>
       <p:ext uri="{BB962C8B-B14F-4D97-AF65-F5344CB8AC3E}">
-        <p14:creationId xmlns:p14="http://schemas.microsoft.com/office/powerpoint/2010/main" val="3813345399"/>
+        <p14:creationId xmlns:p14="http://schemas.microsoft.com/office/powerpoint/2010/main" val="3623388545"/>
       </p:ext>
     </p:extLst>
   </p:cSld>
@@ -22070,7 +22073,7 @@
           <a:p>
             <a:r>
               <a:rPr lang="en-US" dirty="0"/>
-              <a:t>Crowdsourcing Knowledge</a:t>
+              <a:t>MYCIN</a:t>
             </a:r>
           </a:p>
         </p:txBody>
@@ -22082,20 +22085,69 @@
             <a:spLocks noGrp="1"/>
           </p:cNvSpPr>
           <p:nvPr>
-            <p:ph sz="half" idx="1"/>
-          </p:nvPr>
-        </p:nvSpPr>
-        <p:spPr>
-          <a:xfrm>
-            <a:off x="913795" y="1732448"/>
-            <a:ext cx="10353762" cy="4515951"/>
-          </a:xfrm>
-        </p:spPr>
-        <p:txBody>
-          <a:bodyPr>
-            <a:normAutofit/>
-          </a:bodyPr>
+            <p:ph idx="1"/>
+          </p:nvPr>
+        </p:nvSpPr>
+        <p:spPr/>
+        <p:txBody>
+          <a:bodyPr/>
           <a:lstStyle/>
+          <a:p>
+            <a:r>
+              <a:rPr lang="en-US" dirty="0"/>
+              <a:t>Example Rule:</a:t>
+            </a:r>
+          </a:p>
+          <a:p>
+            <a:endParaRPr lang="en-US" dirty="0"/>
+          </a:p>
+          <a:p>
+            <a:r>
+              <a:rPr lang="en-US" dirty="0">
+                <a:effectLst/>
+              </a:rPr>
+              <a:t>IF the infection is primary-bacteremia </a:t>
+            </a:r>
+            <a:br>
+              <a:rPr lang="en-US" dirty="0"/>
+            </a:br>
+            <a:r>
+              <a:rPr lang="en-US" dirty="0">
+                <a:effectLst/>
+              </a:rPr>
+              <a:t>AND the site of the culture is one of the sterile sites </a:t>
+            </a:r>
+            <a:br>
+              <a:rPr lang="en-US" dirty="0"/>
+            </a:br>
+            <a:r>
+              <a:rPr lang="en-US" dirty="0">
+                <a:effectLst/>
+              </a:rPr>
+              <a:t>AND the suspected portal of entry is the gastrointestinal tract </a:t>
+            </a:r>
+            <a:br>
+              <a:rPr lang="en-US" dirty="0"/>
+            </a:br>
+            <a:r>
+              <a:rPr lang="en-US" dirty="0">
+                <a:effectLst/>
+              </a:rPr>
+              <a:t>THEN there is suggestive evidence (0.7) that infection is </a:t>
+            </a:r>
+            <a:r>
+              <a:rPr lang="en-US" dirty="0" err="1">
+                <a:effectLst/>
+              </a:rPr>
+              <a:t>bacteroid</a:t>
+            </a:r>
+            <a:r>
+              <a:rPr lang="en-US" dirty="0">
+                <a:effectLst/>
+              </a:rPr>
+              <a:t>.</a:t>
+            </a:r>
+          </a:p>
           <a:p>
             <a:endParaRPr lang="en-US" dirty="0">
               <a:effectLst/>
@@ -22106,86 +22158,16 @@
               <a:rPr lang="en-US" dirty="0">
                 <a:effectLst/>
               </a:rPr>
-              <a:t>Using the “crowd” to obtain the information you need.</a:t>
-            </a:r>
-          </a:p>
-          <a:p>
-            <a:endParaRPr lang="en-US" dirty="0">
-              <a:effectLst/>
-            </a:endParaRPr>
-          </a:p>
-          <a:p>
-            <a:r>
-              <a:rPr lang="en-US" dirty="0">
-                <a:effectLst/>
-              </a:rPr>
-              <a:t>Amazon Mechanical Turk does this.</a:t>
-            </a:r>
-          </a:p>
-          <a:p>
-            <a:pPr lvl="1"/>
-            <a:r>
-              <a:rPr lang="en-US" dirty="0">
-                <a:effectLst/>
-              </a:rPr>
-              <a:t>You need something translated</a:t>
-            </a:r>
-          </a:p>
-          <a:p>
-            <a:pPr lvl="1"/>
-            <a:r>
-              <a:rPr lang="en-US" dirty="0">
-                <a:effectLst/>
-              </a:rPr>
-              <a:t>You can split each sentence or paragraph into a micro-task</a:t>
-            </a:r>
-          </a:p>
-          <a:p>
-            <a:pPr lvl="1"/>
-            <a:r>
-              <a:rPr lang="en-US" dirty="0">
-                <a:effectLst/>
-              </a:rPr>
-              <a:t>You pay people to complete these tasks</a:t>
-            </a:r>
-          </a:p>
-          <a:p>
-            <a:pPr lvl="1"/>
-            <a:r>
-              <a:rPr lang="en-US" dirty="0">
-                <a:effectLst/>
-              </a:rPr>
-              <a:t>“</a:t>
-            </a:r>
-            <a:r>
-              <a:rPr lang="en-US" dirty="0" err="1">
-                <a:effectLst/>
-              </a:rPr>
-              <a:t>Turkers</a:t>
-            </a:r>
-            <a:r>
-              <a:rPr lang="en-US" dirty="0">
-                <a:effectLst/>
-              </a:rPr>
-              <a:t>” in the crowd do the work for you</a:t>
-            </a:r>
-          </a:p>
-          <a:p>
-            <a:endParaRPr lang="en-US" dirty="0">
-              <a:effectLst/>
-            </a:endParaRPr>
-          </a:p>
-          <a:p>
-            <a:endParaRPr lang="en-US" dirty="0">
-              <a:effectLst/>
-            </a:endParaRPr>
+              <a:t>*Note the probabilistic result (0.7). These probabilities were hardcoded. More recent advances calculate these on the fly (we’ll see this later)</a:t>
+            </a:r>
+            <a:endParaRPr lang="en-US" dirty="0"/>
           </a:p>
         </p:txBody>
       </p:sp>
     </p:spTree>
     <p:extLst>
       <p:ext uri="{BB962C8B-B14F-4D97-AF65-F5344CB8AC3E}">
-        <p14:creationId xmlns:p14="http://schemas.microsoft.com/office/powerpoint/2010/main" val="756479409"/>
+        <p14:creationId xmlns:p14="http://schemas.microsoft.com/office/powerpoint/2010/main" val="506609001"/>
       </p:ext>
     </p:extLst>
   </p:cSld>
@@ -22222,68 +22204,119 @@
             <p:ph type="title"/>
           </p:nvPr>
         </p:nvSpPr>
+        <p:spPr/>
+        <p:txBody>
+          <a:bodyPr/>
+          <a:lstStyle/>
+          <a:p>
+            <a:r>
+              <a:rPr lang="en-US" dirty="0"/>
+              <a:t>SUMMARY: Expert Systems</a:t>
+            </a:r>
+          </a:p>
+        </p:txBody>
+      </p:sp>
+      <p:sp>
+        <p:nvSpPr>
+          <p:cNvPr id="3" name="Content Placeholder 2"/>
+          <p:cNvSpPr>
+            <a:spLocks noGrp="1"/>
+          </p:cNvSpPr>
+          <p:nvPr>
+            <p:ph idx="1"/>
+          </p:nvPr>
+        </p:nvSpPr>
         <p:spPr>
           <a:xfrm>
-            <a:off x="913795" y="76200"/>
-            <a:ext cx="10353762" cy="970450"/>
-          </a:xfrm>
-        </p:spPr>
-        <p:txBody>
-          <a:bodyPr/>
+            <a:off x="913795" y="1732449"/>
+            <a:ext cx="10353762" cy="4820751"/>
+          </a:xfrm>
+        </p:spPr>
+        <p:txBody>
+          <a:bodyPr>
+            <a:normAutofit lnSpcReduction="10000"/>
+          </a:bodyPr>
           <a:lstStyle/>
           <a:p>
             <a:r>
               <a:rPr lang="en-US" dirty="0"/>
-              <a:t>Crowdsourcing Knowledge</a:t>
-            </a:r>
-          </a:p>
-        </p:txBody>
-      </p:sp>
-      <p:pic>
-        <p:nvPicPr>
-          <p:cNvPr id="2050" name="Picture 2" descr="http://www.ringolab.com/note/daiya/archives/espgame01.jpg"/>
-          <p:cNvPicPr>
-            <a:picLocks noChangeAspect="1" noChangeArrowheads="1"/>
-          </p:cNvPicPr>
-          <p:nvPr/>
-        </p:nvPicPr>
-        <p:blipFill>
-          <a:blip r:embed="rId2">
-            <a:extLst>
-              <a:ext uri="{28A0092B-C50C-407E-A947-70E740481C1C}">
-                <a14:useLocalDpi xmlns:a14="http://schemas.microsoft.com/office/drawing/2010/main" val="0"/>
-              </a:ext>
-            </a:extLst>
-          </a:blip>
-          <a:srcRect/>
-          <a:stretch>
-            <a:fillRect/>
-          </a:stretch>
-        </p:blipFill>
-        <p:spPr bwMode="auto">
-          <a:xfrm>
-            <a:off x="3542291" y="1046650"/>
-            <a:ext cx="5096770" cy="5732141"/>
-          </a:xfrm>
-          <a:prstGeom prst="rect">
-            <a:avLst/>
-          </a:prstGeom>
-          <a:noFill/>
-          <a:extLst>
-            <a:ext uri="{909E8E84-426E-40DD-AFC4-6F175D3DCCD1}">
-              <a14:hiddenFill xmlns:a14="http://schemas.microsoft.com/office/drawing/2010/main">
-                <a:solidFill>
-                  <a:srgbClr val="FFFFFF"/>
-                </a:solidFill>
-              </a14:hiddenFill>
-            </a:ext>
-          </a:extLst>
-        </p:spPr>
-      </p:pic>
+              <a:t>Good for developing knowledge of domain experts in a particular field.</a:t>
+            </a:r>
+          </a:p>
+          <a:p>
+            <a:endParaRPr lang="en-US" dirty="0"/>
+          </a:p>
+          <a:p>
+            <a:r>
+              <a:rPr lang="en-US" dirty="0"/>
+              <a:t>Advantages:</a:t>
+            </a:r>
+          </a:p>
+          <a:p>
+            <a:pPr lvl="1"/>
+            <a:r>
+              <a:rPr lang="en-US" dirty="0"/>
+              <a:t>Can explain reasoning</a:t>
+            </a:r>
+          </a:p>
+          <a:p>
+            <a:pPr lvl="1"/>
+            <a:r>
+              <a:rPr lang="en-US" dirty="0"/>
+              <a:t>One system shell can be used to develop system in many domains</a:t>
+            </a:r>
+          </a:p>
+          <a:p>
+            <a:pPr lvl="1"/>
+            <a:r>
+              <a:rPr lang="en-US" dirty="0"/>
+              <a:t>Often very efficient</a:t>
+            </a:r>
+          </a:p>
+          <a:p>
+            <a:pPr lvl="1"/>
+            <a:r>
+              <a:rPr lang="en-US" dirty="0"/>
+              <a:t>Can often deal with most “common” issues, freeing up human experts to deal with rare problems</a:t>
+            </a:r>
+          </a:p>
+          <a:p>
+            <a:pPr lvl="1"/>
+            <a:endParaRPr lang="en-US" dirty="0"/>
+          </a:p>
+          <a:p>
+            <a:r>
+              <a:rPr lang="en-US" dirty="0"/>
+              <a:t>Disadvantages:</a:t>
+            </a:r>
+          </a:p>
+          <a:p>
+            <a:pPr lvl="1"/>
+            <a:r>
+              <a:rPr lang="en-US" dirty="0"/>
+              <a:t>Can be expensive and time-consuming to build (need domain experts, engineers, etc.)</a:t>
+            </a:r>
+          </a:p>
+          <a:p>
+            <a:pPr lvl="1"/>
+            <a:r>
+              <a:rPr lang="en-US" dirty="0"/>
+              <a:t>Can be hard to maintain if knowledge is always changing (knowledge acquisition techniques help)</a:t>
+            </a:r>
+          </a:p>
+          <a:p>
+            <a:pPr lvl="1"/>
+            <a:r>
+              <a:rPr lang="en-US" dirty="0"/>
+              <a:t>Not super general. Most systems solve a VERY specific task.</a:t>
+            </a:r>
+          </a:p>
+        </p:txBody>
+      </p:sp>
     </p:spTree>
     <p:extLst>
       <p:ext uri="{BB962C8B-B14F-4D97-AF65-F5344CB8AC3E}">
-        <p14:creationId xmlns:p14="http://schemas.microsoft.com/office/powerpoint/2010/main" val="3956044991"/>
+        <p14:creationId xmlns:p14="http://schemas.microsoft.com/office/powerpoint/2010/main" val="3193085209"/>
       </p:ext>
     </p:extLst>
   </p:cSld>
@@ -22484,1007 +22517,6 @@
     <p:extLst>
       <p:ext uri="{BB962C8B-B14F-4D97-AF65-F5344CB8AC3E}">
         <p14:creationId xmlns:p14="http://schemas.microsoft.com/office/powerpoint/2010/main" val="2260688262"/>
-      </p:ext>
-    </p:extLst>
-  </p:cSld>
-  <p:clrMapOvr>
-    <a:masterClrMapping/>
-  </p:clrMapOvr>
-</p:sld>
-</file>
-
-<file path=ppt/slides/slide70.xml><?xml version="1.0" encoding="utf-8"?>
-<p:sld xmlns:a="http://schemas.openxmlformats.org/drawingml/2006/main" xmlns:r="http://schemas.openxmlformats.org/officeDocument/2006/relationships" xmlns:p="http://schemas.openxmlformats.org/presentationml/2006/main">
-  <p:cSld>
-    <p:spTree>
-      <p:nvGrpSpPr>
-        <p:cNvPr id="1" name=""/>
-        <p:cNvGrpSpPr/>
-        <p:nvPr/>
-      </p:nvGrpSpPr>
-      <p:grpSpPr>
-        <a:xfrm>
-          <a:off x="0" y="0"/>
-          <a:ext cx="0" cy="0"/>
-          <a:chOff x="0" y="0"/>
-          <a:chExt cx="0" cy="0"/>
-        </a:xfrm>
-      </p:grpSpPr>
-      <p:sp>
-        <p:nvSpPr>
-          <p:cNvPr id="2" name="Title 1"/>
-          <p:cNvSpPr>
-            <a:spLocks noGrp="1"/>
-          </p:cNvSpPr>
-          <p:nvPr>
-            <p:ph type="title"/>
-          </p:nvPr>
-        </p:nvSpPr>
-        <p:spPr>
-          <a:xfrm>
-            <a:off x="913795" y="76200"/>
-            <a:ext cx="10353762" cy="970450"/>
-          </a:xfrm>
-        </p:spPr>
-        <p:txBody>
-          <a:bodyPr/>
-          <a:lstStyle/>
-          <a:p>
-            <a:r>
-              <a:rPr lang="en-US" dirty="0"/>
-              <a:t>Crowdsourcing Knowledge</a:t>
-            </a:r>
-          </a:p>
-        </p:txBody>
-      </p:sp>
-      <p:pic>
-        <p:nvPicPr>
-          <p:cNvPr id="5122" name="Picture 2" descr="http://media.news.harvard.edu/gazette/wp-content/uploads/2011/11/Food_Chart_gray.jpg"/>
-          <p:cNvPicPr>
-            <a:picLocks noChangeAspect="1" noChangeArrowheads="1"/>
-          </p:cNvPicPr>
-          <p:nvPr/>
-        </p:nvPicPr>
-        <p:blipFill>
-          <a:blip r:embed="rId2">
-            <a:extLst>
-              <a:ext uri="{28A0092B-C50C-407E-A947-70E740481C1C}">
-                <a14:useLocalDpi xmlns:a14="http://schemas.microsoft.com/office/drawing/2010/main" val="0"/>
-              </a:ext>
-            </a:extLst>
-          </a:blip>
-          <a:srcRect/>
-          <a:stretch>
-            <a:fillRect/>
-          </a:stretch>
-        </p:blipFill>
-        <p:spPr bwMode="auto">
-          <a:xfrm>
-            <a:off x="609600" y="1295400"/>
-            <a:ext cx="11001709" cy="5038726"/>
-          </a:xfrm>
-          <a:prstGeom prst="rect">
-            <a:avLst/>
-          </a:prstGeom>
-          <a:noFill/>
-          <a:extLst>
-            <a:ext uri="{909E8E84-426E-40DD-AFC4-6F175D3DCCD1}">
-              <a14:hiddenFill xmlns:a14="http://schemas.microsoft.com/office/drawing/2010/main">
-                <a:solidFill>
-                  <a:srgbClr val="FFFFFF"/>
-                </a:solidFill>
-              </a14:hiddenFill>
-            </a:ext>
-          </a:extLst>
-        </p:spPr>
-      </p:pic>
-    </p:spTree>
-    <p:extLst>
-      <p:ext uri="{BB962C8B-B14F-4D97-AF65-F5344CB8AC3E}">
-        <p14:creationId xmlns:p14="http://schemas.microsoft.com/office/powerpoint/2010/main" val="2465071063"/>
-      </p:ext>
-    </p:extLst>
-  </p:cSld>
-  <p:clrMapOvr>
-    <a:masterClrMapping/>
-  </p:clrMapOvr>
-</p:sld>
-</file>
-
-<file path=ppt/slides/slide71.xml><?xml version="1.0" encoding="utf-8"?>
-<p:sld xmlns:a="http://schemas.openxmlformats.org/drawingml/2006/main" xmlns:r="http://schemas.openxmlformats.org/officeDocument/2006/relationships" xmlns:p="http://schemas.openxmlformats.org/presentationml/2006/main">
-  <p:cSld>
-    <p:spTree>
-      <p:nvGrpSpPr>
-        <p:cNvPr id="1" name=""/>
-        <p:cNvGrpSpPr/>
-        <p:nvPr/>
-      </p:nvGrpSpPr>
-      <p:grpSpPr>
-        <a:xfrm>
-          <a:off x="0" y="0"/>
-          <a:ext cx="0" cy="0"/>
-          <a:chOff x="0" y="0"/>
-          <a:chExt cx="0" cy="0"/>
-        </a:xfrm>
-      </p:grpSpPr>
-      <p:sp>
-        <p:nvSpPr>
-          <p:cNvPr id="2" name="Title 1"/>
-          <p:cNvSpPr>
-            <a:spLocks noGrp="1"/>
-          </p:cNvSpPr>
-          <p:nvPr>
-            <p:ph type="title"/>
-          </p:nvPr>
-        </p:nvSpPr>
-        <p:spPr>
-          <a:xfrm>
-            <a:off x="913795" y="76200"/>
-            <a:ext cx="10353762" cy="970450"/>
-          </a:xfrm>
-        </p:spPr>
-        <p:txBody>
-          <a:bodyPr/>
-          <a:lstStyle/>
-          <a:p>
-            <a:r>
-              <a:rPr lang="en-US" dirty="0"/>
-              <a:t>Crowdsourcing Knowledge</a:t>
-            </a:r>
-          </a:p>
-        </p:txBody>
-      </p:sp>
-      <p:pic>
-        <p:nvPicPr>
-          <p:cNvPr id="4" name="Picture 3" descr="ttp://img.skitch.com/20080516-pb6f6b2hnbmdn82j6c2rf6sipg.jpg"/>
-          <p:cNvPicPr/>
-          <p:nvPr/>
-        </p:nvPicPr>
-        <p:blipFill>
-          <a:blip r:embed="rId2"/>
-          <a:srcRect/>
-          <a:stretch>
-            <a:fillRect/>
-          </a:stretch>
-        </p:blipFill>
-        <p:spPr bwMode="auto">
-          <a:xfrm>
-            <a:off x="2471176" y="1062889"/>
-            <a:ext cx="7239000" cy="5386453"/>
-          </a:xfrm>
-          <a:prstGeom prst="rect">
-            <a:avLst/>
-          </a:prstGeom>
-          <a:noFill/>
-          <a:ln w="9525">
-            <a:noFill/>
-            <a:miter lim="800000"/>
-            <a:headEnd/>
-            <a:tailEnd/>
-          </a:ln>
-        </p:spPr>
-      </p:pic>
-    </p:spTree>
-    <p:extLst>
-      <p:ext uri="{BB962C8B-B14F-4D97-AF65-F5344CB8AC3E}">
-        <p14:creationId xmlns:p14="http://schemas.microsoft.com/office/powerpoint/2010/main" val="2180805129"/>
-      </p:ext>
-    </p:extLst>
-  </p:cSld>
-  <p:clrMapOvr>
-    <a:masterClrMapping/>
-  </p:clrMapOvr>
-</p:sld>
-</file>
-
-<file path=ppt/slides/slide72.xml><?xml version="1.0" encoding="utf-8"?>
-<p:sld xmlns:a="http://schemas.openxmlformats.org/drawingml/2006/main" xmlns:r="http://schemas.openxmlformats.org/officeDocument/2006/relationships" xmlns:p="http://schemas.openxmlformats.org/presentationml/2006/main">
-  <p:cSld>
-    <p:spTree>
-      <p:nvGrpSpPr>
-        <p:cNvPr id="1" name=""/>
-        <p:cNvGrpSpPr/>
-        <p:nvPr/>
-      </p:nvGrpSpPr>
-      <p:grpSpPr>
-        <a:xfrm>
-          <a:off x="0" y="0"/>
-          <a:ext cx="0" cy="0"/>
-          <a:chOff x="0" y="0"/>
-          <a:chExt cx="0" cy="0"/>
-        </a:xfrm>
-      </p:grpSpPr>
-      <p:sp>
-        <p:nvSpPr>
-          <p:cNvPr id="2" name="Title 1"/>
-          <p:cNvSpPr>
-            <a:spLocks noGrp="1"/>
-          </p:cNvSpPr>
-          <p:nvPr>
-            <p:ph type="title"/>
-          </p:nvPr>
-        </p:nvSpPr>
-        <p:spPr/>
-        <p:txBody>
-          <a:bodyPr/>
-          <a:lstStyle/>
-          <a:p>
-            <a:r>
-              <a:rPr lang="en-US" dirty="0"/>
-              <a:t>Crowdsourcing Knowledge</a:t>
-            </a:r>
-          </a:p>
-        </p:txBody>
-      </p:sp>
-      <p:sp>
-        <p:nvSpPr>
-          <p:cNvPr id="3" name="Content Placeholder 2"/>
-          <p:cNvSpPr>
-            <a:spLocks noGrp="1"/>
-          </p:cNvSpPr>
-          <p:nvPr>
-            <p:ph sz="half" idx="1"/>
-          </p:nvPr>
-        </p:nvSpPr>
-        <p:spPr>
-          <a:xfrm>
-            <a:off x="913795" y="1732448"/>
-            <a:ext cx="10353762" cy="4515951"/>
-          </a:xfrm>
-        </p:spPr>
-        <p:txBody>
-          <a:bodyPr>
-            <a:normAutofit/>
-          </a:bodyPr>
-          <a:lstStyle/>
-          <a:p>
-            <a:endParaRPr lang="en-US" dirty="0">
-              <a:effectLst/>
-            </a:endParaRPr>
-          </a:p>
-          <a:p>
-            <a:r>
-              <a:rPr lang="en-US" dirty="0">
-                <a:effectLst/>
-              </a:rPr>
-              <a:t>Why would someone help you!!!!</a:t>
-            </a:r>
-          </a:p>
-          <a:p>
-            <a:endParaRPr lang="en-US" dirty="0">
-              <a:effectLst/>
-            </a:endParaRPr>
-          </a:p>
-          <a:p>
-            <a:r>
-              <a:rPr lang="en-US" dirty="0">
-                <a:effectLst/>
-              </a:rPr>
-              <a:t>Turns out most crowdsourcing tools use one of three strategies:</a:t>
-            </a:r>
-          </a:p>
-          <a:p>
-            <a:pPr lvl="1"/>
-            <a:r>
-              <a:rPr lang="en-US" dirty="0">
-                <a:effectLst/>
-              </a:rPr>
-              <a:t>Money (I’ll pay you to help me with this)</a:t>
-            </a:r>
-          </a:p>
-          <a:p>
-            <a:pPr lvl="1"/>
-            <a:r>
-              <a:rPr lang="en-US" dirty="0">
-                <a:effectLst/>
-              </a:rPr>
-              <a:t>Philanthropy (Your work will help </a:t>
-            </a:r>
-            <a:r>
-              <a:rPr lang="en-US" dirty="0" err="1">
-                <a:effectLst/>
-              </a:rPr>
-              <a:t>soooo</a:t>
-            </a:r>
-            <a:r>
-              <a:rPr lang="en-US" dirty="0">
-                <a:effectLst/>
-              </a:rPr>
-              <a:t> many people!)</a:t>
-            </a:r>
-          </a:p>
-          <a:p>
-            <a:pPr lvl="1"/>
-            <a:r>
-              <a:rPr lang="en-US" dirty="0">
-                <a:effectLst/>
-              </a:rPr>
-              <a:t>Fun (It’s a game! It’s “fun”!)</a:t>
-            </a:r>
-          </a:p>
-          <a:p>
-            <a:endParaRPr lang="en-US" dirty="0">
-              <a:effectLst/>
-            </a:endParaRPr>
-          </a:p>
-          <a:p>
-            <a:endParaRPr lang="en-US" dirty="0">
-              <a:effectLst/>
-            </a:endParaRPr>
-          </a:p>
-        </p:txBody>
-      </p:sp>
-    </p:spTree>
-    <p:extLst>
-      <p:ext uri="{BB962C8B-B14F-4D97-AF65-F5344CB8AC3E}">
-        <p14:creationId xmlns:p14="http://schemas.microsoft.com/office/powerpoint/2010/main" val="4096779518"/>
-      </p:ext>
-    </p:extLst>
-  </p:cSld>
-  <p:clrMapOvr>
-    <a:masterClrMapping/>
-  </p:clrMapOvr>
-</p:sld>
-</file>
-
-<file path=ppt/slides/slide73.xml><?xml version="1.0" encoding="utf-8"?>
-<p:sld xmlns:a="http://schemas.openxmlformats.org/drawingml/2006/main" xmlns:r="http://schemas.openxmlformats.org/officeDocument/2006/relationships" xmlns:p="http://schemas.openxmlformats.org/presentationml/2006/main">
-  <p:cSld>
-    <p:spTree>
-      <p:nvGrpSpPr>
-        <p:cNvPr id="1" name=""/>
-        <p:cNvGrpSpPr/>
-        <p:nvPr/>
-      </p:nvGrpSpPr>
-      <p:grpSpPr>
-        <a:xfrm>
-          <a:off x="0" y="0"/>
-          <a:ext cx="0" cy="0"/>
-          <a:chOff x="0" y="0"/>
-          <a:chExt cx="0" cy="0"/>
-        </a:xfrm>
-      </p:grpSpPr>
-      <p:sp>
-        <p:nvSpPr>
-          <p:cNvPr id="55298" name="Rectangle 2"/>
-          <p:cNvSpPr>
-            <a:spLocks noGrp="1" noChangeArrowheads="1"/>
-          </p:cNvSpPr>
-          <p:nvPr>
-            <p:ph type="title"/>
-          </p:nvPr>
-        </p:nvSpPr>
-        <p:spPr/>
-        <p:txBody>
-          <a:bodyPr/>
-          <a:lstStyle/>
-          <a:p>
-            <a:r>
-              <a:rPr lang="en-US" altLang="en-US"/>
-              <a:t>Some Prominent Expert Systems</a:t>
-            </a:r>
-          </a:p>
-        </p:txBody>
-      </p:sp>
-      <p:sp>
-        <p:nvSpPr>
-          <p:cNvPr id="4" name="Content Placeholder 3"/>
-          <p:cNvSpPr>
-            <a:spLocks noGrp="1"/>
-          </p:cNvSpPr>
-          <p:nvPr>
-            <p:ph idx="1"/>
-          </p:nvPr>
-        </p:nvSpPr>
-        <p:spPr/>
-        <p:txBody>
-          <a:bodyPr/>
-          <a:lstStyle/>
-          <a:p>
-            <a:r>
-              <a:rPr lang="en-US" altLang="en-US" b="1" dirty="0" err="1"/>
-              <a:t>Dendral</a:t>
-            </a:r>
-            <a:endParaRPr lang="en-US" altLang="en-US" b="1" dirty="0"/>
-          </a:p>
-          <a:p>
-            <a:pPr>
-              <a:buFont typeface="Wingdings" panose="05000000000000000000" pitchFamily="2" charset="2"/>
-              <a:buNone/>
-            </a:pPr>
-            <a:endParaRPr lang="en-US" altLang="en-US" b="1" dirty="0"/>
-          </a:p>
-          <a:p>
-            <a:r>
-              <a:rPr lang="en-US" altLang="en-US" b="1" dirty="0" err="1"/>
-              <a:t>Dipmeter</a:t>
-            </a:r>
-            <a:r>
-              <a:rPr lang="en-US" altLang="en-US" b="1" dirty="0"/>
-              <a:t> Advisor</a:t>
-            </a:r>
-          </a:p>
-          <a:p>
-            <a:pPr>
-              <a:buFont typeface="Wingdings" panose="05000000000000000000" pitchFamily="2" charset="2"/>
-              <a:buNone/>
-            </a:pPr>
-            <a:endParaRPr lang="en-US" altLang="en-US" b="1" dirty="0"/>
-          </a:p>
-          <a:p>
-            <a:r>
-              <a:rPr lang="en-US" altLang="en-US" b="1" dirty="0" err="1"/>
-              <a:t>Mycin</a:t>
-            </a:r>
-            <a:endParaRPr lang="en-US" altLang="en-US" b="1" dirty="0"/>
-          </a:p>
-          <a:p>
-            <a:pPr>
-              <a:buFont typeface="Wingdings" panose="05000000000000000000" pitchFamily="2" charset="2"/>
-              <a:buNone/>
-            </a:pPr>
-            <a:endParaRPr lang="en-US" altLang="en-US" b="1" dirty="0"/>
-          </a:p>
-          <a:p>
-            <a:r>
-              <a:rPr lang="en-US" altLang="en-US" b="1" dirty="0"/>
-              <a:t>R1/</a:t>
-            </a:r>
-            <a:r>
-              <a:rPr lang="en-US" altLang="en-US" b="1" dirty="0" err="1"/>
-              <a:t>Xcon</a:t>
-            </a:r>
-            <a:endParaRPr lang="en-US" altLang="en-US" b="1" dirty="0"/>
-          </a:p>
-          <a:p>
-            <a:endParaRPr lang="en-US" dirty="0"/>
-          </a:p>
-        </p:txBody>
-      </p:sp>
-    </p:spTree>
-  </p:cSld>
-  <p:clrMapOvr>
-    <a:masterClrMapping/>
-  </p:clrMapOvr>
-</p:sld>
-</file>
-
-<file path=ppt/slides/slide74.xml><?xml version="1.0" encoding="utf-8"?>
-<p:sld xmlns:a="http://schemas.openxmlformats.org/drawingml/2006/main" xmlns:r="http://schemas.openxmlformats.org/officeDocument/2006/relationships" xmlns:p="http://schemas.openxmlformats.org/presentationml/2006/main">
-  <p:cSld>
-    <p:spTree>
-      <p:nvGrpSpPr>
-        <p:cNvPr id="1" name=""/>
-        <p:cNvGrpSpPr/>
-        <p:nvPr/>
-      </p:nvGrpSpPr>
-      <p:grpSpPr>
-        <a:xfrm>
-          <a:off x="0" y="0"/>
-          <a:ext cx="0" cy="0"/>
-          <a:chOff x="0" y="0"/>
-          <a:chExt cx="0" cy="0"/>
-        </a:xfrm>
-      </p:grpSpPr>
-      <p:sp>
-        <p:nvSpPr>
-          <p:cNvPr id="2" name="Title 1"/>
-          <p:cNvSpPr>
-            <a:spLocks noGrp="1"/>
-          </p:cNvSpPr>
-          <p:nvPr>
-            <p:ph type="title"/>
-          </p:nvPr>
-        </p:nvSpPr>
-        <p:spPr/>
-        <p:txBody>
-          <a:bodyPr/>
-          <a:lstStyle/>
-          <a:p>
-            <a:r>
-              <a:rPr lang="en-US" dirty="0"/>
-              <a:t>MYCIN</a:t>
-            </a:r>
-          </a:p>
-        </p:txBody>
-      </p:sp>
-      <p:sp>
-        <p:nvSpPr>
-          <p:cNvPr id="3" name="Content Placeholder 2"/>
-          <p:cNvSpPr>
-            <a:spLocks noGrp="1"/>
-          </p:cNvSpPr>
-          <p:nvPr>
-            <p:ph idx="1"/>
-          </p:nvPr>
-        </p:nvSpPr>
-        <p:spPr>
-          <a:xfrm>
-            <a:off x="913795" y="1732449"/>
-            <a:ext cx="10353762" cy="4592151"/>
-          </a:xfrm>
-        </p:spPr>
-        <p:txBody>
-          <a:bodyPr>
-            <a:normAutofit/>
-          </a:bodyPr>
-          <a:lstStyle/>
-          <a:p>
-            <a:r>
-              <a:rPr lang="en-US" dirty="0"/>
-              <a:t>Developed in the 1970s at Stanford</a:t>
-            </a:r>
-          </a:p>
-          <a:p>
-            <a:endParaRPr lang="en-US" dirty="0"/>
-          </a:p>
-          <a:p>
-            <a:r>
-              <a:rPr lang="en-US" dirty="0"/>
-              <a:t>Job was to diagnose certain blood infections (pretty specific task)</a:t>
-            </a:r>
-          </a:p>
-          <a:p>
-            <a:endParaRPr lang="en-US" dirty="0"/>
-          </a:p>
-          <a:p>
-            <a:r>
-              <a:rPr lang="en-US" dirty="0"/>
-              <a:t>One of the first successful expert systems</a:t>
-            </a:r>
-          </a:p>
-          <a:p>
-            <a:pPr lvl="1"/>
-            <a:r>
-              <a:rPr lang="en-US" dirty="0"/>
-              <a:t>Rule-Based, so very similar to example we saw</a:t>
-            </a:r>
-          </a:p>
-          <a:p>
-            <a:pPr lvl="1"/>
-            <a:endParaRPr lang="en-US" dirty="0"/>
-          </a:p>
-          <a:p>
-            <a:r>
-              <a:rPr lang="en-US" dirty="0"/>
-              <a:t>Written in LISP (</a:t>
-            </a:r>
-            <a:r>
-              <a:rPr lang="en-US" dirty="0" err="1"/>
-              <a:t>Woooooooo</a:t>
-            </a:r>
-            <a:r>
-              <a:rPr lang="en-US" dirty="0"/>
-              <a:t>…LISP!!!!)</a:t>
-            </a:r>
-          </a:p>
-          <a:p>
-            <a:endParaRPr lang="en-US" dirty="0"/>
-          </a:p>
-          <a:p>
-            <a:r>
-              <a:rPr lang="en-US" dirty="0"/>
-              <a:t>Goal-directed system (uses backward chaining primarily)</a:t>
-            </a:r>
-          </a:p>
-        </p:txBody>
-      </p:sp>
-    </p:spTree>
-    <p:extLst>
-      <p:ext uri="{BB962C8B-B14F-4D97-AF65-F5344CB8AC3E}">
-        <p14:creationId xmlns:p14="http://schemas.microsoft.com/office/powerpoint/2010/main" val="2576179616"/>
-      </p:ext>
-    </p:extLst>
-  </p:cSld>
-  <p:clrMapOvr>
-    <a:masterClrMapping/>
-  </p:clrMapOvr>
-</p:sld>
-</file>
-
-<file path=ppt/slides/slide75.xml><?xml version="1.0" encoding="utf-8"?>
-<p:sld xmlns:a="http://schemas.openxmlformats.org/drawingml/2006/main" xmlns:r="http://schemas.openxmlformats.org/officeDocument/2006/relationships" xmlns:p="http://schemas.openxmlformats.org/presentationml/2006/main">
-  <p:cSld>
-    <p:spTree>
-      <p:nvGrpSpPr>
-        <p:cNvPr id="1" name=""/>
-        <p:cNvGrpSpPr/>
-        <p:nvPr/>
-      </p:nvGrpSpPr>
-      <p:grpSpPr>
-        <a:xfrm>
-          <a:off x="0" y="0"/>
-          <a:ext cx="0" cy="0"/>
-          <a:chOff x="0" y="0"/>
-          <a:chExt cx="0" cy="0"/>
-        </a:xfrm>
-      </p:grpSpPr>
-      <p:sp>
-        <p:nvSpPr>
-          <p:cNvPr id="2" name="Title 1"/>
-          <p:cNvSpPr>
-            <a:spLocks noGrp="1"/>
-          </p:cNvSpPr>
-          <p:nvPr>
-            <p:ph type="title"/>
-          </p:nvPr>
-        </p:nvSpPr>
-        <p:spPr/>
-        <p:txBody>
-          <a:bodyPr/>
-          <a:lstStyle/>
-          <a:p>
-            <a:r>
-              <a:rPr lang="en-US" dirty="0"/>
-              <a:t>MYCIN</a:t>
-            </a:r>
-          </a:p>
-        </p:txBody>
-      </p:sp>
-      <p:sp>
-        <p:nvSpPr>
-          <p:cNvPr id="3" name="Content Placeholder 2"/>
-          <p:cNvSpPr>
-            <a:spLocks noGrp="1"/>
-          </p:cNvSpPr>
-          <p:nvPr>
-            <p:ph idx="1"/>
-          </p:nvPr>
-        </p:nvSpPr>
-        <p:spPr/>
-        <p:txBody>
-          <a:bodyPr/>
-          <a:lstStyle/>
-          <a:p>
-            <a:r>
-              <a:rPr lang="en-US" dirty="0"/>
-              <a:t>Used backward chaining…but</a:t>
-            </a:r>
-          </a:p>
-          <a:p>
-            <a:pPr lvl="1"/>
-            <a:r>
-              <a:rPr lang="en-US" dirty="0"/>
-              <a:t>As it is backward chaining, would ask the patient questions if it hit a variable that it needed an answer to.</a:t>
-            </a:r>
-          </a:p>
-          <a:p>
-            <a:pPr lvl="2"/>
-            <a:r>
-              <a:rPr lang="en-US" dirty="0"/>
-              <a:t>Example: if chaining runs into “User feels dizzy” and doesn’t know, it would prompt user to answer</a:t>
-            </a:r>
-          </a:p>
-          <a:p>
-            <a:pPr lvl="2"/>
-            <a:r>
-              <a:rPr lang="en-US" dirty="0"/>
-              <a:t>This would sometimes lead to user being asked MANY questions</a:t>
-            </a:r>
-          </a:p>
-          <a:p>
-            <a:pPr lvl="2"/>
-            <a:endParaRPr lang="en-US" dirty="0"/>
-          </a:p>
-          <a:p>
-            <a:pPr lvl="1"/>
-            <a:r>
-              <a:rPr lang="en-US" dirty="0"/>
-              <a:t>Used heuristics to simplify the backward chaining search</a:t>
-            </a:r>
-          </a:p>
-          <a:p>
-            <a:pPr lvl="2"/>
-            <a:r>
-              <a:rPr lang="en-US" dirty="0"/>
-              <a:t>Some paths ignored and not explored</a:t>
-            </a:r>
-          </a:p>
-          <a:p>
-            <a:pPr lvl="2"/>
-            <a:endParaRPr lang="en-US" dirty="0"/>
-          </a:p>
-          <a:p>
-            <a:pPr lvl="1"/>
-            <a:r>
-              <a:rPr lang="en-US" dirty="0"/>
-              <a:t>Also would ask general questions to all patients to try to simplify the search process</a:t>
-            </a:r>
-          </a:p>
-        </p:txBody>
-      </p:sp>
-    </p:spTree>
-    <p:extLst>
-      <p:ext uri="{BB962C8B-B14F-4D97-AF65-F5344CB8AC3E}">
-        <p14:creationId xmlns:p14="http://schemas.microsoft.com/office/powerpoint/2010/main" val="3623388545"/>
-      </p:ext>
-    </p:extLst>
-  </p:cSld>
-  <p:clrMapOvr>
-    <a:masterClrMapping/>
-  </p:clrMapOvr>
-</p:sld>
-</file>
-
-<file path=ppt/slides/slide76.xml><?xml version="1.0" encoding="utf-8"?>
-<p:sld xmlns:a="http://schemas.openxmlformats.org/drawingml/2006/main" xmlns:r="http://schemas.openxmlformats.org/officeDocument/2006/relationships" xmlns:p="http://schemas.openxmlformats.org/presentationml/2006/main">
-  <p:cSld>
-    <p:spTree>
-      <p:nvGrpSpPr>
-        <p:cNvPr id="1" name=""/>
-        <p:cNvGrpSpPr/>
-        <p:nvPr/>
-      </p:nvGrpSpPr>
-      <p:grpSpPr>
-        <a:xfrm>
-          <a:off x="0" y="0"/>
-          <a:ext cx="0" cy="0"/>
-          <a:chOff x="0" y="0"/>
-          <a:chExt cx="0" cy="0"/>
-        </a:xfrm>
-      </p:grpSpPr>
-      <p:sp>
-        <p:nvSpPr>
-          <p:cNvPr id="2" name="Title 1"/>
-          <p:cNvSpPr>
-            <a:spLocks noGrp="1"/>
-          </p:cNvSpPr>
-          <p:nvPr>
-            <p:ph type="title"/>
-          </p:nvPr>
-        </p:nvSpPr>
-        <p:spPr/>
-        <p:txBody>
-          <a:bodyPr/>
-          <a:lstStyle/>
-          <a:p>
-            <a:r>
-              <a:rPr lang="en-US" dirty="0"/>
-              <a:t>MYCIN</a:t>
-            </a:r>
-          </a:p>
-        </p:txBody>
-      </p:sp>
-      <p:sp>
-        <p:nvSpPr>
-          <p:cNvPr id="3" name="Content Placeholder 2"/>
-          <p:cNvSpPr>
-            <a:spLocks noGrp="1"/>
-          </p:cNvSpPr>
-          <p:nvPr>
-            <p:ph idx="1"/>
-          </p:nvPr>
-        </p:nvSpPr>
-        <p:spPr/>
-        <p:txBody>
-          <a:bodyPr/>
-          <a:lstStyle/>
-          <a:p>
-            <a:r>
-              <a:rPr lang="en-US" dirty="0"/>
-              <a:t>Example Rule:</a:t>
-            </a:r>
-          </a:p>
-          <a:p>
-            <a:endParaRPr lang="en-US" dirty="0"/>
-          </a:p>
-          <a:p>
-            <a:r>
-              <a:rPr lang="en-US" dirty="0">
-                <a:effectLst/>
-              </a:rPr>
-              <a:t>IF the infection is primary-bacteremia </a:t>
-            </a:r>
-            <a:br>
-              <a:rPr lang="en-US" dirty="0"/>
-            </a:br>
-            <a:r>
-              <a:rPr lang="en-US" dirty="0">
-                <a:effectLst/>
-              </a:rPr>
-              <a:t>AND the site of the culture is one of the sterile sites </a:t>
-            </a:r>
-            <a:br>
-              <a:rPr lang="en-US" dirty="0"/>
-            </a:br>
-            <a:r>
-              <a:rPr lang="en-US" dirty="0">
-                <a:effectLst/>
-              </a:rPr>
-              <a:t>AND the suspected portal of entry is the gastrointestinal tract </a:t>
-            </a:r>
-            <a:br>
-              <a:rPr lang="en-US" dirty="0"/>
-            </a:br>
-            <a:r>
-              <a:rPr lang="en-US" dirty="0">
-                <a:effectLst/>
-              </a:rPr>
-              <a:t>THEN there is suggestive evidence (0.7) that infection is </a:t>
-            </a:r>
-            <a:r>
-              <a:rPr lang="en-US" dirty="0" err="1">
-                <a:effectLst/>
-              </a:rPr>
-              <a:t>bacteroid</a:t>
-            </a:r>
-            <a:r>
-              <a:rPr lang="en-US" dirty="0">
-                <a:effectLst/>
-              </a:rPr>
-              <a:t>.</a:t>
-            </a:r>
-          </a:p>
-          <a:p>
-            <a:endParaRPr lang="en-US" dirty="0">
-              <a:effectLst/>
-            </a:endParaRPr>
-          </a:p>
-          <a:p>
-            <a:r>
-              <a:rPr lang="en-US" dirty="0">
-                <a:effectLst/>
-              </a:rPr>
-              <a:t>*Note the probabilistic result (0.7). These probabilities were hardcoded. More recent advances calculate these on the fly (we’ll see this later)</a:t>
-            </a:r>
-            <a:endParaRPr lang="en-US" dirty="0"/>
-          </a:p>
-        </p:txBody>
-      </p:sp>
-    </p:spTree>
-    <p:extLst>
-      <p:ext uri="{BB962C8B-B14F-4D97-AF65-F5344CB8AC3E}">
-        <p14:creationId xmlns:p14="http://schemas.microsoft.com/office/powerpoint/2010/main" val="506609001"/>
-      </p:ext>
-    </p:extLst>
-  </p:cSld>
-  <p:clrMapOvr>
-    <a:masterClrMapping/>
-  </p:clrMapOvr>
-</p:sld>
-</file>
-
-<file path=ppt/slides/slide77.xml><?xml version="1.0" encoding="utf-8"?>
-<p:sld xmlns:a="http://schemas.openxmlformats.org/drawingml/2006/main" xmlns:r="http://schemas.openxmlformats.org/officeDocument/2006/relationships" xmlns:p="http://schemas.openxmlformats.org/presentationml/2006/main">
-  <p:cSld>
-    <p:spTree>
-      <p:nvGrpSpPr>
-        <p:cNvPr id="1" name=""/>
-        <p:cNvGrpSpPr/>
-        <p:nvPr/>
-      </p:nvGrpSpPr>
-      <p:grpSpPr>
-        <a:xfrm>
-          <a:off x="0" y="0"/>
-          <a:ext cx="0" cy="0"/>
-          <a:chOff x="0" y="0"/>
-          <a:chExt cx="0" cy="0"/>
-        </a:xfrm>
-      </p:grpSpPr>
-      <p:sp>
-        <p:nvSpPr>
-          <p:cNvPr id="2" name="Title 1"/>
-          <p:cNvSpPr>
-            <a:spLocks noGrp="1"/>
-          </p:cNvSpPr>
-          <p:nvPr>
-            <p:ph type="title"/>
-          </p:nvPr>
-        </p:nvSpPr>
-        <p:spPr/>
-        <p:txBody>
-          <a:bodyPr/>
-          <a:lstStyle/>
-          <a:p>
-            <a:r>
-              <a:rPr lang="en-US" dirty="0"/>
-              <a:t>SUMMARY: Expert Systems</a:t>
-            </a:r>
-          </a:p>
-        </p:txBody>
-      </p:sp>
-      <p:sp>
-        <p:nvSpPr>
-          <p:cNvPr id="3" name="Content Placeholder 2"/>
-          <p:cNvSpPr>
-            <a:spLocks noGrp="1"/>
-          </p:cNvSpPr>
-          <p:nvPr>
-            <p:ph idx="1"/>
-          </p:nvPr>
-        </p:nvSpPr>
-        <p:spPr>
-          <a:xfrm>
-            <a:off x="913795" y="1732449"/>
-            <a:ext cx="10353762" cy="4820751"/>
-          </a:xfrm>
-        </p:spPr>
-        <p:txBody>
-          <a:bodyPr>
-            <a:normAutofit lnSpcReduction="10000"/>
-          </a:bodyPr>
-          <a:lstStyle/>
-          <a:p>
-            <a:r>
-              <a:rPr lang="en-US" dirty="0"/>
-              <a:t>Good for developing knowledge of domain experts in a particular field.</a:t>
-            </a:r>
-          </a:p>
-          <a:p>
-            <a:endParaRPr lang="en-US" dirty="0"/>
-          </a:p>
-          <a:p>
-            <a:r>
-              <a:rPr lang="en-US" dirty="0"/>
-              <a:t>Advantages:</a:t>
-            </a:r>
-          </a:p>
-          <a:p>
-            <a:pPr lvl="1"/>
-            <a:r>
-              <a:rPr lang="en-US" dirty="0"/>
-              <a:t>Can explain reasoning</a:t>
-            </a:r>
-          </a:p>
-          <a:p>
-            <a:pPr lvl="1"/>
-            <a:r>
-              <a:rPr lang="en-US" dirty="0"/>
-              <a:t>One system shell can be used to develop system in many domains</a:t>
-            </a:r>
-          </a:p>
-          <a:p>
-            <a:pPr lvl="1"/>
-            <a:r>
-              <a:rPr lang="en-US" dirty="0"/>
-              <a:t>Often very efficient</a:t>
-            </a:r>
-          </a:p>
-          <a:p>
-            <a:pPr lvl="1"/>
-            <a:r>
-              <a:rPr lang="en-US" dirty="0"/>
-              <a:t>Can often deal with most “common” issues, freeing up human experts to deal with rare problems</a:t>
-            </a:r>
-          </a:p>
-          <a:p>
-            <a:pPr lvl="1"/>
-            <a:endParaRPr lang="en-US" dirty="0"/>
-          </a:p>
-          <a:p>
-            <a:r>
-              <a:rPr lang="en-US" dirty="0"/>
-              <a:t>Disadvantages:</a:t>
-            </a:r>
-          </a:p>
-          <a:p>
-            <a:pPr lvl="1"/>
-            <a:r>
-              <a:rPr lang="en-US" dirty="0"/>
-              <a:t>Can be expensive and time-consuming to build (need domain experts, engineers, etc.)</a:t>
-            </a:r>
-          </a:p>
-          <a:p>
-            <a:pPr lvl="1"/>
-            <a:r>
-              <a:rPr lang="en-US" dirty="0"/>
-              <a:t>Can be hard to maintain if knowledge is always changing (knowledge acquisition techniques help)</a:t>
-            </a:r>
-          </a:p>
-          <a:p>
-            <a:pPr lvl="1"/>
-            <a:r>
-              <a:rPr lang="en-US" dirty="0"/>
-              <a:t>Not super general. Most systems solve a VERY specific task.</a:t>
-            </a:r>
-          </a:p>
-        </p:txBody>
-      </p:sp>
-    </p:spTree>
-    <p:extLst>
-      <p:ext uri="{BB962C8B-B14F-4D97-AF65-F5344CB8AC3E}">
-        <p14:creationId xmlns:p14="http://schemas.microsoft.com/office/powerpoint/2010/main" val="3193085209"/>
       </p:ext>
     </p:extLst>
   </p:cSld>

</xml_diff>